<commit_message>
Named bookmarks done and before adding suggestions in route search view
</commit_message>
<xml_diff>
--- a/Reitti/Pictures/Pictures.pptx
+++ b/Reitti/Pictures/Pictures.pptx
@@ -123,7 +123,7 @@
   </p:defaultTextStyle>
   <p:extLst>
     <p:ext uri="{EFAFB233-063F-42B5-8137-9DF3F51BA10A}">
-      <p15:sldGuideLst xmlns:p15="http://schemas.microsoft.com/office/powerpoint/2012/main" xmlns="">
+      <p15:sldGuideLst xmlns="" xmlns:p15="http://schemas.microsoft.com/office/powerpoint/2012/main">
         <p15:guide id="1" orient="horz" pos="2160" userDrawn="1">
           <p15:clr>
             <a:srgbClr val="A4A3A4"/>
@@ -271,7 +271,7 @@
           <a:p>
             <a:fld id="{447593BF-50A8-4560-8C02-A22D325087EC}" type="datetimeFigureOut">
               <a:rPr lang="en-GB" smtClean="0"/>
-              <a:t>5/10/14</a:t>
+              <a:t>29/3/15</a:t>
             </a:fld>
             <a:endParaRPr lang="en-GB"/>
           </a:p>
@@ -441,7 +441,7 @@
           <a:p>
             <a:fld id="{447593BF-50A8-4560-8C02-A22D325087EC}" type="datetimeFigureOut">
               <a:rPr lang="en-GB" smtClean="0"/>
-              <a:t>5/10/14</a:t>
+              <a:t>29/3/15</a:t>
             </a:fld>
             <a:endParaRPr lang="en-GB"/>
           </a:p>
@@ -621,7 +621,7 @@
           <a:p>
             <a:fld id="{447593BF-50A8-4560-8C02-A22D325087EC}" type="datetimeFigureOut">
               <a:rPr lang="en-GB" smtClean="0"/>
-              <a:t>5/10/14</a:t>
+              <a:t>29/3/15</a:t>
             </a:fld>
             <a:endParaRPr lang="en-GB"/>
           </a:p>
@@ -791,7 +791,7 @@
           <a:p>
             <a:fld id="{447593BF-50A8-4560-8C02-A22D325087EC}" type="datetimeFigureOut">
               <a:rPr lang="en-GB" smtClean="0"/>
-              <a:t>5/10/14</a:t>
+              <a:t>29/3/15</a:t>
             </a:fld>
             <a:endParaRPr lang="en-GB"/>
           </a:p>
@@ -1037,7 +1037,7 @@
           <a:p>
             <a:fld id="{447593BF-50A8-4560-8C02-A22D325087EC}" type="datetimeFigureOut">
               <a:rPr lang="en-GB" smtClean="0"/>
-              <a:t>5/10/14</a:t>
+              <a:t>29/3/15</a:t>
             </a:fld>
             <a:endParaRPr lang="en-GB"/>
           </a:p>
@@ -1269,7 +1269,7 @@
           <a:p>
             <a:fld id="{447593BF-50A8-4560-8C02-A22D325087EC}" type="datetimeFigureOut">
               <a:rPr lang="en-GB" smtClean="0"/>
-              <a:t>5/10/14</a:t>
+              <a:t>29/3/15</a:t>
             </a:fld>
             <a:endParaRPr lang="en-GB"/>
           </a:p>
@@ -1636,7 +1636,7 @@
           <a:p>
             <a:fld id="{447593BF-50A8-4560-8C02-A22D325087EC}" type="datetimeFigureOut">
               <a:rPr lang="en-GB" smtClean="0"/>
-              <a:t>5/10/14</a:t>
+              <a:t>29/3/15</a:t>
             </a:fld>
             <a:endParaRPr lang="en-GB"/>
           </a:p>
@@ -1754,7 +1754,7 @@
           <a:p>
             <a:fld id="{447593BF-50A8-4560-8C02-A22D325087EC}" type="datetimeFigureOut">
               <a:rPr lang="en-GB" smtClean="0"/>
-              <a:t>5/10/14</a:t>
+              <a:t>29/3/15</a:t>
             </a:fld>
             <a:endParaRPr lang="en-GB"/>
           </a:p>
@@ -1849,7 +1849,7 @@
           <a:p>
             <a:fld id="{447593BF-50A8-4560-8C02-A22D325087EC}" type="datetimeFigureOut">
               <a:rPr lang="en-GB" smtClean="0"/>
-              <a:t>5/10/14</a:t>
+              <a:t>29/3/15</a:t>
             </a:fld>
             <a:endParaRPr lang="en-GB"/>
           </a:p>
@@ -2126,7 +2126,7 @@
           <a:p>
             <a:fld id="{447593BF-50A8-4560-8C02-A22D325087EC}" type="datetimeFigureOut">
               <a:rPr lang="en-GB" smtClean="0"/>
-              <a:t>5/10/14</a:t>
+              <a:t>29/3/15</a:t>
             </a:fld>
             <a:endParaRPr lang="en-GB"/>
           </a:p>
@@ -2379,7 +2379,7 @@
           <a:p>
             <a:fld id="{447593BF-50A8-4560-8C02-A22D325087EC}" type="datetimeFigureOut">
               <a:rPr lang="en-GB" smtClean="0"/>
-              <a:t>5/10/14</a:t>
+              <a:t>29/3/15</a:t>
             </a:fld>
             <a:endParaRPr lang="en-GB"/>
           </a:p>
@@ -2592,7 +2592,7 @@
           <a:p>
             <a:fld id="{447593BF-50A8-4560-8C02-A22D325087EC}" type="datetimeFigureOut">
               <a:rPr lang="en-GB" smtClean="0"/>
-              <a:t>5/10/14</a:t>
+              <a:t>29/3/15</a:t>
             </a:fld>
             <a:endParaRPr lang="en-GB"/>
           </a:p>
@@ -6907,6 +6907,16 @@
 <file path=ppt/slides/slide17.xml><?xml version="1.0" encoding="utf-8"?>
 <p:sld xmlns:a="http://schemas.openxmlformats.org/drawingml/2006/main" xmlns:r="http://schemas.openxmlformats.org/officeDocument/2006/relationships" xmlns:p="http://schemas.openxmlformats.org/presentationml/2006/main">
   <p:cSld>
+    <p:bg>
+      <p:bgPr>
+        <a:solidFill>
+          <a:schemeClr val="bg1">
+            <a:lumMod val="50000"/>
+          </a:schemeClr>
+        </a:solidFill>
+        <a:effectLst/>
+      </p:bgPr>
+    </p:bg>
     <p:spTree>
       <p:nvGrpSpPr>
         <p:cNvPr id="1" name=""/>
@@ -7020,6 +7030,118 @@
           </a:fontRef>
         </p:style>
       </p:cxnSp>
+      <p:pic>
+        <p:nvPicPr>
+          <p:cNvPr id="2" name="Picture 1" descr="Up Left-100.png"/>
+          <p:cNvPicPr>
+            <a:picLocks noChangeAspect="1"/>
+          </p:cNvPicPr>
+          <p:nvPr/>
+        </p:nvPicPr>
+        <p:blipFill>
+          <a:blip r:embed="rId4">
+            <a:extLst>
+              <a:ext uri="{28A0092B-C50C-407E-A947-70E740481C1C}">
+                <a14:useLocalDpi xmlns:a14="http://schemas.microsoft.com/office/drawing/2010/main" val="0"/>
+              </a:ext>
+            </a:extLst>
+          </a:blip>
+          <a:stretch>
+            <a:fillRect/>
+          </a:stretch>
+        </p:blipFill>
+        <p:spPr>
+          <a:xfrm>
+            <a:off x="4081291" y="1492568"/>
+            <a:ext cx="1270000" cy="1270000"/>
+          </a:xfrm>
+          <a:prstGeom prst="rect">
+            <a:avLst/>
+          </a:prstGeom>
+        </p:spPr>
+      </p:pic>
+      <p:pic>
+        <p:nvPicPr>
+          <p:cNvPr id="6" name="Picture 5" descr="Up Left-100.png"/>
+          <p:cNvPicPr>
+            <a:picLocks noChangeAspect="1"/>
+          </p:cNvPicPr>
+          <p:nvPr/>
+        </p:nvPicPr>
+        <p:blipFill rotWithShape="1">
+          <a:blip r:embed="rId4">
+            <a:extLst>
+              <a:ext uri="{28A0092B-C50C-407E-A947-70E740481C1C}">
+                <a14:useLocalDpi xmlns:a14="http://schemas.microsoft.com/office/drawing/2010/main" val="0"/>
+              </a:ext>
+            </a:extLst>
+          </a:blip>
+          <a:srcRect r="41935" b="47028"/>
+          <a:stretch/>
+        </p:blipFill>
+        <p:spPr>
+          <a:xfrm rot="5400000">
+            <a:off x="2837808" y="5237088"/>
+            <a:ext cx="737425" cy="672741"/>
+          </a:xfrm>
+          <a:prstGeom prst="rect">
+            <a:avLst/>
+          </a:prstGeom>
+        </p:spPr>
+      </p:pic>
+      <p:pic>
+        <p:nvPicPr>
+          <p:cNvPr id="8" name="Picture 7" descr="Up Left-100.png"/>
+          <p:cNvPicPr>
+            <a:picLocks noChangeAspect="1"/>
+          </p:cNvPicPr>
+          <p:nvPr/>
+        </p:nvPicPr>
+        <p:blipFill rotWithShape="1">
+          <a:blip r:embed="rId4">
+            <a:extLst>
+              <a:ext uri="{28A0092B-C50C-407E-A947-70E740481C1C}">
+                <a14:useLocalDpi xmlns:a14="http://schemas.microsoft.com/office/drawing/2010/main" val="0"/>
+              </a:ext>
+            </a:extLst>
+          </a:blip>
+          <a:srcRect r="41935" b="47028"/>
+          <a:stretch/>
+        </p:blipFill>
+        <p:spPr>
+          <a:xfrm rot="16200000">
+            <a:off x="2598243" y="4856371"/>
+            <a:ext cx="737425" cy="672741"/>
+          </a:xfrm>
+          <a:prstGeom prst="rect">
+            <a:avLst/>
+          </a:prstGeom>
+        </p:spPr>
+      </p:pic>
+      <p:pic>
+        <p:nvPicPr>
+          <p:cNvPr id="3" name="Picture 2"/>
+          <p:cNvPicPr>
+            <a:picLocks noChangeAspect="1"/>
+          </p:cNvPicPr>
+          <p:nvPr/>
+        </p:nvPicPr>
+        <p:blipFill>
+          <a:blip r:embed="rId5"/>
+          <a:stretch>
+            <a:fillRect/>
+          </a:stretch>
+        </p:blipFill>
+        <p:spPr>
+          <a:xfrm>
+            <a:off x="4711700" y="1854200"/>
+            <a:ext cx="2768600" cy="3149600"/>
+          </a:xfrm>
+          <a:prstGeom prst="rect">
+            <a:avLst/>
+          </a:prstGeom>
+        </p:spPr>
+      </p:pic>
     </p:spTree>
     <p:extLst>
       <p:ext uri="{BB962C8B-B14F-4D97-AF65-F5344CB8AC3E}">
@@ -9371,7 +9493,7 @@
   <a:extraClrSchemeLst/>
   <a:extLst>
     <a:ext uri="{05A4C25C-085E-4340-85A3-A5531E510DB2}">
-      <thm15:themeFamily xmlns:thm15="http://schemas.microsoft.com/office/thememl/2012/main" xmlns="" name="Office Theme" id="{62F939B6-93AF-4DB8-9C6B-D6C7DFDC589F}" vid="{4A3C46E8-61CC-4603-A589-7422A47A8E4A}"/>
+      <thm15:themeFamily xmlns="" xmlns:thm15="http://schemas.microsoft.com/office/thememl/2012/main" name="Office Theme" id="{62F939B6-93AF-4DB8-9C6B-D6C7DFDC589F}" vid="{4A3C46E8-61CC-4603-A589-7422A47A8E4A}"/>
     </a:ext>
   </a:extLst>
 </a:theme>

</xml_diff>

<commit_message>
before making uichange in detail view and everything else almost done
</commit_message>
<xml_diff>
--- a/Reitti/Pictures/Pictures.pptx
+++ b/Reitti/Pictures/Pictures.pptx
@@ -3978,7 +3978,7 @@
         <p:spPr>
           <a:xfrm>
             <a:off x="848344" y="1538049"/>
-            <a:ext cx="4194048" cy="4498848"/>
+            <a:ext cx="1245799" cy="1336337"/>
           </a:xfrm>
           <a:prstGeom prst="rect">
             <a:avLst/>
@@ -3993,8 +3993,8 @@
         </p:nvSpPr>
         <p:spPr>
           <a:xfrm>
-            <a:off x="1507694" y="1702186"/>
-            <a:ext cx="2939170" cy="2979042"/>
+            <a:off x="1073234" y="1601914"/>
+            <a:ext cx="814991" cy="884894"/>
           </a:xfrm>
           <a:prstGeom prst="ellipse">
             <a:avLst/>
@@ -4085,8 +4085,8 @@
         </p:blipFill>
         <p:spPr>
           <a:xfrm>
-            <a:off x="2021904" y="2058683"/>
-            <a:ext cx="1888223" cy="1888223"/>
+            <a:off x="1203116" y="1707740"/>
+            <a:ext cx="560877" cy="560877"/>
           </a:xfrm>
           <a:prstGeom prst="rect">
             <a:avLst/>
@@ -4303,6 +4303,36 @@
           <a:xfrm>
             <a:off x="10039528" y="-347771"/>
             <a:ext cx="1791120" cy="1791120"/>
+          </a:xfrm>
+          <a:prstGeom prst="rect">
+            <a:avLst/>
+          </a:prstGeom>
+        </p:spPr>
+      </p:pic>
+      <p:pic>
+        <p:nvPicPr>
+          <p:cNvPr id="3" name="Picture 2" descr="Marker-100.png"/>
+          <p:cNvPicPr>
+            <a:picLocks noChangeAspect="1"/>
+          </p:cNvPicPr>
+          <p:nvPr/>
+        </p:nvPicPr>
+        <p:blipFill>
+          <a:blip r:embed="rId4">
+            <a:extLst>
+              <a:ext uri="{28A0092B-C50C-407E-A947-70E740481C1C}">
+                <a14:useLocalDpi xmlns:a14="http://schemas.microsoft.com/office/drawing/2010/main" val="0"/>
+              </a:ext>
+            </a:extLst>
+          </a:blip>
+          <a:stretch>
+            <a:fillRect/>
+          </a:stretch>
+        </p:blipFill>
+        <p:spPr>
+          <a:xfrm>
+            <a:off x="7382645" y="1941712"/>
+            <a:ext cx="2119195" cy="2119195"/>
           </a:xfrm>
           <a:prstGeom prst="rect">
             <a:avLst/>

</xml_diff>

<commit_message>
- Notifications done - Travel card almost done   - Remaining is adding a card from app   - separate file listing all ids and variables
</commit_message>
<xml_diff>
--- a/Reitti/Pictures/Pictures.pptx
+++ b/Reitti/Pictures/Pictures.pptx
@@ -135,7 +135,7 @@
   </p:defaultTextStyle>
   <p:extLst>
     <p:ext uri="{EFAFB233-063F-42B5-8137-9DF3F51BA10A}">
-      <p15:sldGuideLst xmlns:p15="http://schemas.microsoft.com/office/powerpoint/2012/main" xmlns="">
+      <p15:sldGuideLst xmlns="" xmlns:p15="http://schemas.microsoft.com/office/powerpoint/2012/main">
         <p15:guide id="1" orient="horz" pos="2160" userDrawn="1">
           <p15:clr>
             <a:srgbClr val="A4A3A4"/>
@@ -283,7 +283,7 @@
           <a:p>
             <a:fld id="{447593BF-50A8-4560-8C02-A22D325087EC}" type="datetimeFigureOut">
               <a:rPr lang="en-GB" smtClean="0"/>
-              <a:t>27/6/15</a:t>
+              <a:t>3/7/15</a:t>
             </a:fld>
             <a:endParaRPr lang="en-GB"/>
           </a:p>
@@ -453,7 +453,7 @@
           <a:p>
             <a:fld id="{447593BF-50A8-4560-8C02-A22D325087EC}" type="datetimeFigureOut">
               <a:rPr lang="en-GB" smtClean="0"/>
-              <a:t>27/6/15</a:t>
+              <a:t>3/7/15</a:t>
             </a:fld>
             <a:endParaRPr lang="en-GB"/>
           </a:p>
@@ -633,7 +633,7 @@
           <a:p>
             <a:fld id="{447593BF-50A8-4560-8C02-A22D325087EC}" type="datetimeFigureOut">
               <a:rPr lang="en-GB" smtClean="0"/>
-              <a:t>27/6/15</a:t>
+              <a:t>3/7/15</a:t>
             </a:fld>
             <a:endParaRPr lang="en-GB"/>
           </a:p>
@@ -803,7 +803,7 @@
           <a:p>
             <a:fld id="{447593BF-50A8-4560-8C02-A22D325087EC}" type="datetimeFigureOut">
               <a:rPr lang="en-GB" smtClean="0"/>
-              <a:t>27/6/15</a:t>
+              <a:t>3/7/15</a:t>
             </a:fld>
             <a:endParaRPr lang="en-GB"/>
           </a:p>
@@ -1049,7 +1049,7 @@
           <a:p>
             <a:fld id="{447593BF-50A8-4560-8C02-A22D325087EC}" type="datetimeFigureOut">
               <a:rPr lang="en-GB" smtClean="0"/>
-              <a:t>27/6/15</a:t>
+              <a:t>3/7/15</a:t>
             </a:fld>
             <a:endParaRPr lang="en-GB"/>
           </a:p>
@@ -1281,7 +1281,7 @@
           <a:p>
             <a:fld id="{447593BF-50A8-4560-8C02-A22D325087EC}" type="datetimeFigureOut">
               <a:rPr lang="en-GB" smtClean="0"/>
-              <a:t>27/6/15</a:t>
+              <a:t>3/7/15</a:t>
             </a:fld>
             <a:endParaRPr lang="en-GB"/>
           </a:p>
@@ -1648,7 +1648,7 @@
           <a:p>
             <a:fld id="{447593BF-50A8-4560-8C02-A22D325087EC}" type="datetimeFigureOut">
               <a:rPr lang="en-GB" smtClean="0"/>
-              <a:t>27/6/15</a:t>
+              <a:t>3/7/15</a:t>
             </a:fld>
             <a:endParaRPr lang="en-GB"/>
           </a:p>
@@ -1766,7 +1766,7 @@
           <a:p>
             <a:fld id="{447593BF-50A8-4560-8C02-A22D325087EC}" type="datetimeFigureOut">
               <a:rPr lang="en-GB" smtClean="0"/>
-              <a:t>27/6/15</a:t>
+              <a:t>3/7/15</a:t>
             </a:fld>
             <a:endParaRPr lang="en-GB"/>
           </a:p>
@@ -1861,7 +1861,7 @@
           <a:p>
             <a:fld id="{447593BF-50A8-4560-8C02-A22D325087EC}" type="datetimeFigureOut">
               <a:rPr lang="en-GB" smtClean="0"/>
-              <a:t>27/6/15</a:t>
+              <a:t>3/7/15</a:t>
             </a:fld>
             <a:endParaRPr lang="en-GB"/>
           </a:p>
@@ -2138,7 +2138,7 @@
           <a:p>
             <a:fld id="{447593BF-50A8-4560-8C02-A22D325087EC}" type="datetimeFigureOut">
               <a:rPr lang="en-GB" smtClean="0"/>
-              <a:t>27/6/15</a:t>
+              <a:t>3/7/15</a:t>
             </a:fld>
             <a:endParaRPr lang="en-GB"/>
           </a:p>
@@ -2391,7 +2391,7 @@
           <a:p>
             <a:fld id="{447593BF-50A8-4560-8C02-A22D325087EC}" type="datetimeFigureOut">
               <a:rPr lang="en-GB" smtClean="0"/>
-              <a:t>27/6/15</a:t>
+              <a:t>3/7/15</a:t>
             </a:fld>
             <a:endParaRPr lang="en-GB"/>
           </a:p>
@@ -2604,7 +2604,7 @@
           <a:p>
             <a:fld id="{447593BF-50A8-4560-8C02-A22D325087EC}" type="datetimeFigureOut">
               <a:rPr lang="en-GB" smtClean="0"/>
-              <a:t>27/6/15</a:t>
+              <a:t>3/7/15</a:t>
             </a:fld>
             <a:endParaRPr lang="en-GB"/>
           </a:p>
@@ -9991,6 +9991,85 @@
           </a:p>
         </p:txBody>
       </p:sp>
+      <p:pic>
+        <p:nvPicPr>
+          <p:cNvPr id="2" name="Picture 1"/>
+          <p:cNvPicPr>
+            <a:picLocks noChangeAspect="1"/>
+          </p:cNvPicPr>
+          <p:nvPr/>
+        </p:nvPicPr>
+        <p:blipFill>
+          <a:blip r:embed="rId5"/>
+          <a:stretch>
+            <a:fillRect/>
+          </a:stretch>
+        </p:blipFill>
+        <p:spPr>
+          <a:xfrm>
+            <a:off x="2709694" y="3136786"/>
+            <a:ext cx="1137492" cy="1156293"/>
+          </a:xfrm>
+          <a:prstGeom prst="roundRect">
+            <a:avLst/>
+          </a:prstGeom>
+        </p:spPr>
+      </p:pic>
+      <p:pic>
+        <p:nvPicPr>
+          <p:cNvPr id="11" name="Picture 10"/>
+          <p:cNvPicPr>
+            <a:picLocks noChangeAspect="1"/>
+          </p:cNvPicPr>
+          <p:nvPr/>
+        </p:nvPicPr>
+        <p:blipFill>
+          <a:blip r:embed="rId5"/>
+          <a:stretch>
+            <a:fillRect/>
+          </a:stretch>
+        </p:blipFill>
+        <p:spPr>
+          <a:xfrm>
+            <a:off x="4551402" y="3165896"/>
+            <a:ext cx="1137492" cy="1156293"/>
+          </a:xfrm>
+          <a:prstGeom prst="roundRect">
+            <a:avLst/>
+          </a:prstGeom>
+        </p:spPr>
+      </p:pic>
+      <p:pic>
+        <p:nvPicPr>
+          <p:cNvPr id="4" name="Picture 3"/>
+          <p:cNvPicPr>
+            <a:picLocks noChangeAspect="1"/>
+          </p:cNvPicPr>
+          <p:nvPr/>
+        </p:nvPicPr>
+        <p:blipFill>
+          <a:blip r:embed="rId6"/>
+          <a:stretch>
+            <a:fillRect/>
+          </a:stretch>
+        </p:blipFill>
+        <p:spPr>
+          <a:xfrm>
+            <a:off x="2894652" y="1065516"/>
+            <a:ext cx="1396439" cy="1419520"/>
+          </a:xfrm>
+          <a:prstGeom prst="roundRect">
+            <a:avLst/>
+          </a:prstGeom>
+          <a:ln w="9525" cmpd="sng">
+            <a:solidFill>
+              <a:schemeClr val="bg1">
+                <a:lumMod val="50000"/>
+              </a:schemeClr>
+            </a:solidFill>
+          </a:ln>
+        </p:spPr>
+      </p:pic>
     </p:spTree>
     <p:extLst>
       <p:ext uri="{BB962C8B-B14F-4D97-AF65-F5344CB8AC3E}">
@@ -18574,7 +18653,7 @@
   <a:extraClrSchemeLst/>
   <a:extLst>
     <a:ext uri="{05A4C25C-085E-4340-85A3-A5531E510DB2}">
-      <thm15:themeFamily xmlns:thm15="http://schemas.microsoft.com/office/thememl/2012/main" xmlns="" name="Office Theme" id="{62F939B6-93AF-4DB8-9C6B-D6C7DFDC589F}" vid="{4A3C46E8-61CC-4603-A589-7422A47A8E4A}"/>
+      <thm15:themeFamily xmlns="" xmlns:thm15="http://schemas.microsoft.com/office/thememl/2012/main" name="Office Theme" id="{62F939B6-93AF-4DB8-9C6B-D6C7DFDC589F}" vid="{4A3C46E8-61CC-4603-A589-7422A47A8E4A}"/>
     </a:ext>
   </a:extLst>
 </a:theme>

</xml_diff>